<commit_message>
Update Stakeholdrers meeting II_Rev2.pptx
Update
</commit_message>
<xml_diff>
--- a/docs/Presentations/Stakeholdrers meeting II_Rev2.pptx
+++ b/docs/Presentations/Stakeholdrers meeting II_Rev2.pptx
@@ -1662,7 +1662,7 @@
           <a:p>
             <a:fld id="{05F25DE2-B715-4EA4-8CF0-DA425EA806A7}" type="datetimeFigureOut">
               <a:rPr lang="en-GB" smtClean="0"/>
-              <a:t>22/02/2022</a:t>
+              <a:t>23/02/2022</a:t>
             </a:fld>
             <a:endParaRPr lang="en-GB"/>
           </a:p>
@@ -16248,14 +16248,14 @@
           <p:nvPr>
             <p:extLst>
               <p:ext uri="{D42A27DB-BD31-4B8C-83A1-F6EECF244321}">
-                <p14:modId xmlns:p14="http://schemas.microsoft.com/office/powerpoint/2010/main" val="3548657275"/>
+                <p14:modId xmlns:p14="http://schemas.microsoft.com/office/powerpoint/2010/main" val="422900364"/>
               </p:ext>
             </p:extLst>
           </p:nvPr>
         </p:nvGraphicFramePr>
         <p:xfrm>
-          <a:off x="1618138" y="915670"/>
-          <a:ext cx="6385243" cy="3545840"/>
+          <a:off x="1550404" y="855429"/>
+          <a:ext cx="6385243" cy="3769360"/>
         </p:xfrm>
         <a:graphic>
           <a:graphicData uri="http://schemas.openxmlformats.org/drawingml/2006/table">
@@ -16428,7 +16428,7 @@
                     <a:p>
                       <a:r>
                         <a:rPr lang="en-US" sz="1100" dirty="0"/>
-                        <a:t>Hardware available</a:t>
+                        <a:t>Hardware partly available</a:t>
                       </a:r>
                       <a:endParaRPr lang="en-NL" sz="1100" dirty="0"/>
                     </a:p>
@@ -16485,7 +16485,7 @@
                     <a:bodyPr/>
                     <a:lstStyle/>
                     <a:p>
-                      <a:endParaRPr lang="en-NL" sz="1100"/>
+                      <a:endParaRPr lang="en-NL" sz="1100" dirty="0"/>
                     </a:p>
                   </a:txBody>
                   <a:tcPr/>
@@ -16497,7 +16497,7 @@
                     <a:p>
                       <a:r>
                         <a:rPr lang="en-US" sz="1100" dirty="0"/>
-                        <a:t>Achieve learning goals all members</a:t>
+                        <a:t>Achieve learning goals from all members</a:t>
                       </a:r>
                       <a:endParaRPr lang="en-NL" sz="1100" dirty="0"/>
                     </a:p>
@@ -16612,7 +16612,7 @@
                     <a:p>
                       <a:r>
                         <a:rPr lang="en-US" sz="1100" dirty="0"/>
-                        <a:t>Do not achieve learning goals all members</a:t>
+                        <a:t>Do not achieve learning goals from all members</a:t>
                       </a:r>
                       <a:endParaRPr lang="en-NL" sz="1100" dirty="0"/>
                     </a:p>
@@ -16699,7 +16699,7 @@
                     <a:p>
                       <a:r>
                         <a:rPr lang="en-US" sz="1100" dirty="0"/>
-                        <a:t>Need to understand how to use </a:t>
+                        <a:t>Need to understand how to use RT DB</a:t>
                       </a:r>
                       <a:endParaRPr lang="en-NL" sz="1100" dirty="0"/>
                     </a:p>
@@ -16756,6 +16756,10 @@
                     <a:bodyPr/>
                     <a:lstStyle/>
                     <a:p>
+                      <a:r>
+                        <a:rPr lang="en-US" sz="1100" dirty="0"/>
+                        <a:t>Do not achieve the stakeholders’ goal</a:t>
+                      </a:r>
                       <a:endParaRPr lang="en-NL" sz="1100" dirty="0"/>
                     </a:p>
                   </a:txBody>
@@ -16766,7 +16770,7 @@
                     <a:bodyPr/>
                     <a:lstStyle/>
                     <a:p>
-                      <a:endParaRPr lang="en-NL" sz="1100"/>
+                      <a:endParaRPr lang="en-NL" sz="1100" dirty="0"/>
                     </a:p>
                   </a:txBody>
                   <a:tcPr/>

</xml_diff>